<commit_message>
Edit: RecommendationDao.xml recommendationAdd sql 수정
</commit_message>
<xml_diff>
--- a/GabojaGoProject개요.pptx
+++ b/GabojaGoProject개요.pptx
@@ -7,6 +7,7 @@
   <p:sldIdLst>
     <p:sldId id="256" r:id="rId2"/>
     <p:sldId id="257" r:id="rId3"/>
+    <p:sldId id="258" r:id="rId4"/>
   </p:sldIdLst>
   <p:sldSz cx="12192000" cy="6858000"/>
   <p:notesSz cx="6858000" cy="9144000"/>
@@ -105,6 +106,11 @@
       </a:defRPr>
     </a:lvl9pPr>
   </p:defaultTextStyle>
+  <p:extLst>
+    <p:ext uri="{EFAFB233-063F-42B5-8137-9DF3F51BA10A}">
+      <p15:sldGuideLst xmlns:p15="http://schemas.microsoft.com/office/powerpoint/2012/main"/>
+    </p:ext>
+  </p:extLst>
 </p:presentation>
 </file>
 
@@ -257,7 +263,7 @@
           <a:p>
             <a:fld id="{358A6BA6-A05E-E24E-A1CE-34039D9AE190}" type="datetimeFigureOut">
               <a:rPr kumimoji="1" lang="ko-Kore-KR" altLang="en-US" smtClean="0"/>
-              <a:t>2022. 11. 1.</a:t>
+              <a:t>2022. 11. 7.</a:t>
             </a:fld>
             <a:endParaRPr kumimoji="1" lang="ko-Kore-KR" altLang="en-US"/>
           </a:p>
@@ -457,7 +463,7 @@
           <a:p>
             <a:fld id="{358A6BA6-A05E-E24E-A1CE-34039D9AE190}" type="datetimeFigureOut">
               <a:rPr kumimoji="1" lang="ko-Kore-KR" altLang="en-US" smtClean="0"/>
-              <a:t>2022. 11. 1.</a:t>
+              <a:t>2022. 11. 7.</a:t>
             </a:fld>
             <a:endParaRPr kumimoji="1" lang="ko-Kore-KR" altLang="en-US"/>
           </a:p>
@@ -667,7 +673,7 @@
           <a:p>
             <a:fld id="{358A6BA6-A05E-E24E-A1CE-34039D9AE190}" type="datetimeFigureOut">
               <a:rPr kumimoji="1" lang="ko-Kore-KR" altLang="en-US" smtClean="0"/>
-              <a:t>2022. 11. 1.</a:t>
+              <a:t>2022. 11. 7.</a:t>
             </a:fld>
             <a:endParaRPr kumimoji="1" lang="ko-Kore-KR" altLang="en-US"/>
           </a:p>
@@ -867,7 +873,7 @@
           <a:p>
             <a:fld id="{358A6BA6-A05E-E24E-A1CE-34039D9AE190}" type="datetimeFigureOut">
               <a:rPr kumimoji="1" lang="ko-Kore-KR" altLang="en-US" smtClean="0"/>
-              <a:t>2022. 11. 1.</a:t>
+              <a:t>2022. 11. 7.</a:t>
             </a:fld>
             <a:endParaRPr kumimoji="1" lang="ko-Kore-KR" altLang="en-US"/>
           </a:p>
@@ -1143,7 +1149,7 @@
           <a:p>
             <a:fld id="{358A6BA6-A05E-E24E-A1CE-34039D9AE190}" type="datetimeFigureOut">
               <a:rPr kumimoji="1" lang="ko-Kore-KR" altLang="en-US" smtClean="0"/>
-              <a:t>2022. 11. 1.</a:t>
+              <a:t>2022. 11. 7.</a:t>
             </a:fld>
             <a:endParaRPr kumimoji="1" lang="ko-Kore-KR" altLang="en-US"/>
           </a:p>
@@ -1411,7 +1417,7 @@
           <a:p>
             <a:fld id="{358A6BA6-A05E-E24E-A1CE-34039D9AE190}" type="datetimeFigureOut">
               <a:rPr kumimoji="1" lang="ko-Kore-KR" altLang="en-US" smtClean="0"/>
-              <a:t>2022. 11. 1.</a:t>
+              <a:t>2022. 11. 7.</a:t>
             </a:fld>
             <a:endParaRPr kumimoji="1" lang="ko-Kore-KR" altLang="en-US"/>
           </a:p>
@@ -1826,7 +1832,7 @@
           <a:p>
             <a:fld id="{358A6BA6-A05E-E24E-A1CE-34039D9AE190}" type="datetimeFigureOut">
               <a:rPr kumimoji="1" lang="ko-Kore-KR" altLang="en-US" smtClean="0"/>
-              <a:t>2022. 11. 1.</a:t>
+              <a:t>2022. 11. 7.</a:t>
             </a:fld>
             <a:endParaRPr kumimoji="1" lang="ko-Kore-KR" altLang="en-US"/>
           </a:p>
@@ -1968,7 +1974,7 @@
           <a:p>
             <a:fld id="{358A6BA6-A05E-E24E-A1CE-34039D9AE190}" type="datetimeFigureOut">
               <a:rPr kumimoji="1" lang="ko-Kore-KR" altLang="en-US" smtClean="0"/>
-              <a:t>2022. 11. 1.</a:t>
+              <a:t>2022. 11. 7.</a:t>
             </a:fld>
             <a:endParaRPr kumimoji="1" lang="ko-Kore-KR" altLang="en-US"/>
           </a:p>
@@ -2081,7 +2087,7 @@
           <a:p>
             <a:fld id="{358A6BA6-A05E-E24E-A1CE-34039D9AE190}" type="datetimeFigureOut">
               <a:rPr kumimoji="1" lang="ko-Kore-KR" altLang="en-US" smtClean="0"/>
-              <a:t>2022. 11. 1.</a:t>
+              <a:t>2022. 11. 7.</a:t>
             </a:fld>
             <a:endParaRPr kumimoji="1" lang="ko-Kore-KR" altLang="en-US"/>
           </a:p>
@@ -2394,7 +2400,7 @@
           <a:p>
             <a:fld id="{358A6BA6-A05E-E24E-A1CE-34039D9AE190}" type="datetimeFigureOut">
               <a:rPr kumimoji="1" lang="ko-Kore-KR" altLang="en-US" smtClean="0"/>
-              <a:t>2022. 11. 1.</a:t>
+              <a:t>2022. 11. 7.</a:t>
             </a:fld>
             <a:endParaRPr kumimoji="1" lang="ko-Kore-KR" altLang="en-US"/>
           </a:p>
@@ -2683,7 +2689,7 @@
           <a:p>
             <a:fld id="{358A6BA6-A05E-E24E-A1CE-34039D9AE190}" type="datetimeFigureOut">
               <a:rPr kumimoji="1" lang="ko-Kore-KR" altLang="en-US" smtClean="0"/>
-              <a:t>2022. 11. 1.</a:t>
+              <a:t>2022. 11. 7.</a:t>
             </a:fld>
             <a:endParaRPr kumimoji="1" lang="ko-Kore-KR" altLang="en-US"/>
           </a:p>
@@ -2926,7 +2932,7 @@
           <a:p>
             <a:fld id="{358A6BA6-A05E-E24E-A1CE-34039D9AE190}" type="datetimeFigureOut">
               <a:rPr kumimoji="1" lang="ko-Kore-KR" altLang="en-US" smtClean="0"/>
-              <a:t>2022. 11. 1.</a:t>
+              <a:t>2022. 11. 7.</a:t>
             </a:fld>
             <a:endParaRPr kumimoji="1" lang="ko-Kore-KR" altLang="en-US"/>
           </a:p>
@@ -4322,6 +4328,1272 @@
 </p:sld>
 </file>
 
+<file path=ppt/slides/slide3.xml><?xml version="1.0" encoding="utf-8"?>
+<p:sld xmlns:a="http://schemas.openxmlformats.org/drawingml/2006/main" xmlns:r="http://schemas.openxmlformats.org/officeDocument/2006/relationships" xmlns:p="http://schemas.openxmlformats.org/presentationml/2006/main">
+  <p:cSld>
+    <p:spTree>
+      <p:nvGrpSpPr>
+        <p:cNvPr id="1" name=""/>
+        <p:cNvGrpSpPr/>
+        <p:nvPr/>
+      </p:nvGrpSpPr>
+      <p:grpSpPr>
+        <a:xfrm>
+          <a:off x="0" y="0"/>
+          <a:ext cx="0" cy="0"/>
+          <a:chOff x="0" y="0"/>
+          <a:chExt cx="0" cy="0"/>
+        </a:xfrm>
+      </p:grpSpPr>
+      <p:sp>
+        <p:nvSpPr>
+          <p:cNvPr id="17" name="직사각형 16">
+            <a:extLst>
+              <a:ext uri="{FF2B5EF4-FFF2-40B4-BE49-F238E27FC236}">
+                <a16:creationId xmlns:a16="http://schemas.microsoft.com/office/drawing/2014/main" id="{870E9089-29E6-2EBB-6F66-FE0B2A7E711D}"/>
+              </a:ext>
+            </a:extLst>
+          </p:cNvPr>
+          <p:cNvSpPr/>
+          <p:nvPr/>
+        </p:nvSpPr>
+        <p:spPr>
+          <a:xfrm>
+            <a:off x="4809067" y="158044"/>
+            <a:ext cx="7157155" cy="1456263"/>
+          </a:xfrm>
+          <a:prstGeom prst="rect">
+            <a:avLst/>
+          </a:prstGeom>
+        </p:spPr>
+        <p:style>
+          <a:lnRef idx="3">
+            <a:schemeClr val="lt1"/>
+          </a:lnRef>
+          <a:fillRef idx="1">
+            <a:schemeClr val="accent5"/>
+          </a:fillRef>
+          <a:effectRef idx="1">
+            <a:schemeClr val="accent5"/>
+          </a:effectRef>
+          <a:fontRef idx="minor">
+            <a:schemeClr val="lt1"/>
+          </a:fontRef>
+        </p:style>
+        <p:txBody>
+          <a:bodyPr rtlCol="0" anchor="t"/>
+          <a:lstStyle/>
+          <a:p>
+            <a:pPr algn="ctr"/>
+            <a:r>
+              <a:rPr kumimoji="1" lang="en-US" altLang="ko-Kore-KR" dirty="0"/>
+              <a:t>Controller</a:t>
+            </a:r>
+            <a:endParaRPr kumimoji="1" lang="ko-Kore-KR" altLang="en-US" dirty="0"/>
+          </a:p>
+        </p:txBody>
+      </p:sp>
+      <p:sp>
+        <p:nvSpPr>
+          <p:cNvPr id="4" name="직사각형 3">
+            <a:extLst>
+              <a:ext uri="{FF2B5EF4-FFF2-40B4-BE49-F238E27FC236}">
+                <a16:creationId xmlns:a16="http://schemas.microsoft.com/office/drawing/2014/main" id="{6A482098-825C-D1ED-36A8-799F32567105}"/>
+              </a:ext>
+            </a:extLst>
+          </p:cNvPr>
+          <p:cNvSpPr/>
+          <p:nvPr/>
+        </p:nvSpPr>
+        <p:spPr>
+          <a:xfrm>
+            <a:off x="474134" y="423332"/>
+            <a:ext cx="1535289" cy="925689"/>
+          </a:xfrm>
+          <a:prstGeom prst="rect">
+            <a:avLst/>
+          </a:prstGeom>
+        </p:spPr>
+        <p:style>
+          <a:lnRef idx="2">
+            <a:schemeClr val="accent1">
+              <a:shade val="50000"/>
+            </a:schemeClr>
+          </a:lnRef>
+          <a:fillRef idx="1">
+            <a:schemeClr val="accent1"/>
+          </a:fillRef>
+          <a:effectRef idx="0">
+            <a:schemeClr val="accent1"/>
+          </a:effectRef>
+          <a:fontRef idx="minor">
+            <a:schemeClr val="lt1"/>
+          </a:fontRef>
+        </p:style>
+        <p:txBody>
+          <a:bodyPr rtlCol="0" anchor="ctr"/>
+          <a:lstStyle/>
+          <a:p>
+            <a:pPr algn="ctr"/>
+            <a:r>
+              <a:rPr kumimoji="1" lang="en-US" altLang="ko-Kore-KR" sz="900" dirty="0" err="1"/>
+              <a:t>jangSoReviewForm</a:t>
+            </a:r>
+            <a:r>
+              <a:rPr kumimoji="1" lang="en-US" altLang="ko-Kore-KR" sz="900" dirty="0"/>
+              <a:t>:</a:t>
+            </a:r>
+          </a:p>
+          <a:p>
+            <a:pPr algn="ctr"/>
+            <a:r>
+              <a:rPr kumimoji="1" lang="en-US" altLang="ko-Kore-KR" sz="900" b="1" dirty="0"/>
+              <a:t>title</a:t>
+            </a:r>
+          </a:p>
+          <a:p>
+            <a:pPr algn="ctr"/>
+            <a:r>
+              <a:rPr kumimoji="1" lang="en-US" altLang="ko-Kore-KR" sz="900" b="1" dirty="0" err="1"/>
+              <a:t>cont</a:t>
+            </a:r>
+            <a:endParaRPr kumimoji="1" lang="en-US" altLang="ko-Kore-KR" sz="900" b="1" dirty="0"/>
+          </a:p>
+          <a:p>
+            <a:pPr algn="ctr"/>
+            <a:r>
+              <a:rPr kumimoji="1" lang="en-US" altLang="ko-KR" sz="900" b="1" dirty="0"/>
+              <a:t>fi</a:t>
+            </a:r>
+            <a:r>
+              <a:rPr kumimoji="1" lang="en-US" altLang="ko-Kore-KR" sz="900" b="1" dirty="0"/>
+              <a:t>les</a:t>
+            </a:r>
+          </a:p>
+          <a:p>
+            <a:pPr algn="ctr"/>
+            <a:r>
+              <a:rPr kumimoji="1" lang="ko-KR" altLang="en-US" sz="900" b="1" dirty="0"/>
+              <a:t>입력</a:t>
+            </a:r>
+            <a:endParaRPr kumimoji="1" lang="ko-Kore-KR" altLang="en-US" sz="900" b="1" dirty="0"/>
+          </a:p>
+        </p:txBody>
+      </p:sp>
+      <p:sp>
+        <p:nvSpPr>
+          <p:cNvPr id="5" name="직사각형 4">
+            <a:extLst>
+              <a:ext uri="{FF2B5EF4-FFF2-40B4-BE49-F238E27FC236}">
+                <a16:creationId xmlns:a16="http://schemas.microsoft.com/office/drawing/2014/main" id="{3AF832FB-02B0-0249-EF90-3FA4D75B84BE}"/>
+              </a:ext>
+            </a:extLst>
+          </p:cNvPr>
+          <p:cNvSpPr/>
+          <p:nvPr/>
+        </p:nvSpPr>
+        <p:spPr>
+          <a:xfrm>
+            <a:off x="2918177" y="598311"/>
+            <a:ext cx="1535289" cy="575733"/>
+          </a:xfrm>
+          <a:prstGeom prst="rect">
+            <a:avLst/>
+          </a:prstGeom>
+        </p:spPr>
+        <p:style>
+          <a:lnRef idx="2">
+            <a:schemeClr val="accent1">
+              <a:shade val="50000"/>
+            </a:schemeClr>
+          </a:lnRef>
+          <a:fillRef idx="1">
+            <a:schemeClr val="accent1"/>
+          </a:fillRef>
+          <a:effectRef idx="0">
+            <a:schemeClr val="accent1"/>
+          </a:effectRef>
+          <a:fontRef idx="minor">
+            <a:schemeClr val="lt1"/>
+          </a:fontRef>
+        </p:style>
+        <p:txBody>
+          <a:bodyPr rtlCol="0" anchor="ctr"/>
+          <a:lstStyle/>
+          <a:p>
+            <a:pPr algn="ctr"/>
+            <a:r>
+              <a:rPr kumimoji="1" lang="ko-KR" altLang="en-US" sz="900" dirty="0"/>
+              <a:t>저장버튼 클릭</a:t>
+            </a:r>
+            <a:endParaRPr kumimoji="1" lang="ko-Kore-KR" altLang="en-US" sz="900" dirty="0"/>
+          </a:p>
+        </p:txBody>
+      </p:sp>
+      <p:cxnSp>
+        <p:nvCxnSpPr>
+          <p:cNvPr id="7" name="직선 화살표 연결선 6">
+            <a:extLst>
+              <a:ext uri="{FF2B5EF4-FFF2-40B4-BE49-F238E27FC236}">
+                <a16:creationId xmlns:a16="http://schemas.microsoft.com/office/drawing/2014/main" id="{C7E5515E-8573-7514-AFEF-D28D61C1B051}"/>
+              </a:ext>
+            </a:extLst>
+          </p:cNvPr>
+          <p:cNvCxnSpPr>
+            <a:stCxn id="4" idx="3"/>
+            <a:endCxn id="5" idx="1"/>
+          </p:cNvCxnSpPr>
+          <p:nvPr/>
+        </p:nvCxnSpPr>
+        <p:spPr>
+          <a:xfrm>
+            <a:off x="2009423" y="886177"/>
+            <a:ext cx="908754" cy="1"/>
+          </a:xfrm>
+          <a:prstGeom prst="straightConnector1">
+            <a:avLst/>
+          </a:prstGeom>
+          <a:ln>
+            <a:tailEnd type="triangle"/>
+          </a:ln>
+        </p:spPr>
+        <p:style>
+          <a:lnRef idx="3">
+            <a:schemeClr val="accent1"/>
+          </a:lnRef>
+          <a:fillRef idx="0">
+            <a:schemeClr val="accent1"/>
+          </a:fillRef>
+          <a:effectRef idx="2">
+            <a:schemeClr val="accent1"/>
+          </a:effectRef>
+          <a:fontRef idx="minor">
+            <a:schemeClr val="tx1"/>
+          </a:fontRef>
+        </p:style>
+      </p:cxnSp>
+      <p:sp>
+        <p:nvSpPr>
+          <p:cNvPr id="8" name="직사각형 7">
+            <a:extLst>
+              <a:ext uri="{FF2B5EF4-FFF2-40B4-BE49-F238E27FC236}">
+                <a16:creationId xmlns:a16="http://schemas.microsoft.com/office/drawing/2014/main" id="{6DB41AC3-D795-5668-0D8F-449C9A868FB7}"/>
+              </a:ext>
+            </a:extLst>
+          </p:cNvPr>
+          <p:cNvSpPr/>
+          <p:nvPr/>
+        </p:nvSpPr>
+        <p:spPr>
+          <a:xfrm>
+            <a:off x="5328355" y="598311"/>
+            <a:ext cx="1535289" cy="575733"/>
+          </a:xfrm>
+          <a:prstGeom prst="rect">
+            <a:avLst/>
+          </a:prstGeom>
+        </p:spPr>
+        <p:style>
+          <a:lnRef idx="2">
+            <a:schemeClr val="accent1">
+              <a:shade val="50000"/>
+            </a:schemeClr>
+          </a:lnRef>
+          <a:fillRef idx="1">
+            <a:schemeClr val="accent1"/>
+          </a:fillRef>
+          <a:effectRef idx="0">
+            <a:schemeClr val="accent1"/>
+          </a:effectRef>
+          <a:fontRef idx="minor">
+            <a:schemeClr val="lt1"/>
+          </a:fontRef>
+        </p:style>
+        <p:txBody>
+          <a:bodyPr rtlCol="0" anchor="ctr"/>
+          <a:lstStyle/>
+          <a:p>
+            <a:pPr algn="ctr"/>
+            <a:r>
+              <a:rPr kumimoji="1" lang="ko-KR" altLang="en-US" sz="900" dirty="0"/>
+              <a:t>하나의 장소리뷰에 </a:t>
+            </a:r>
+            <a:r>
+              <a:rPr kumimoji="1" lang="ko-KR" altLang="en-US" sz="900" dirty="0" err="1"/>
+              <a:t>여러개의</a:t>
+            </a:r>
+            <a:r>
+              <a:rPr kumimoji="1" lang="ko-KR" altLang="en-US" sz="900" dirty="0"/>
+              <a:t> 첨부파일 저장</a:t>
+            </a:r>
+            <a:endParaRPr kumimoji="1" lang="en-US" altLang="ko-KR" sz="900" dirty="0"/>
+          </a:p>
+          <a:p>
+            <a:pPr algn="ctr"/>
+            <a:r>
+              <a:rPr kumimoji="1" lang="en-US" altLang="ko-Kore-KR" sz="900" dirty="0"/>
+              <a:t>Vo </a:t>
+            </a:r>
+            <a:r>
+              <a:rPr kumimoji="1" lang="ko-KR" altLang="en-US" sz="900" dirty="0"/>
+              <a:t>이용</a:t>
+            </a:r>
+            <a:endParaRPr kumimoji="1" lang="ko-Kore-KR" altLang="en-US" sz="900" dirty="0"/>
+          </a:p>
+        </p:txBody>
+      </p:sp>
+      <p:cxnSp>
+        <p:nvCxnSpPr>
+          <p:cNvPr id="9" name="직선 화살표 연결선 8">
+            <a:extLst>
+              <a:ext uri="{FF2B5EF4-FFF2-40B4-BE49-F238E27FC236}">
+                <a16:creationId xmlns:a16="http://schemas.microsoft.com/office/drawing/2014/main" id="{EFB479DC-3D40-3C8C-3227-552160E6C7FB}"/>
+              </a:ext>
+            </a:extLst>
+          </p:cNvPr>
+          <p:cNvCxnSpPr>
+            <a:cxnSpLocks/>
+            <a:stCxn id="5" idx="3"/>
+            <a:endCxn id="8" idx="1"/>
+          </p:cNvCxnSpPr>
+          <p:nvPr/>
+        </p:nvCxnSpPr>
+        <p:spPr>
+          <a:xfrm>
+            <a:off x="4453466" y="886178"/>
+            <a:ext cx="874889" cy="0"/>
+          </a:xfrm>
+          <a:prstGeom prst="straightConnector1">
+            <a:avLst/>
+          </a:prstGeom>
+          <a:ln>
+            <a:tailEnd type="triangle"/>
+          </a:ln>
+        </p:spPr>
+        <p:style>
+          <a:lnRef idx="3">
+            <a:schemeClr val="accent1"/>
+          </a:lnRef>
+          <a:fillRef idx="0">
+            <a:schemeClr val="accent1"/>
+          </a:fillRef>
+          <a:effectRef idx="2">
+            <a:schemeClr val="accent1"/>
+          </a:effectRef>
+          <a:fontRef idx="minor">
+            <a:schemeClr val="tx1"/>
+          </a:fontRef>
+        </p:style>
+      </p:cxnSp>
+      <p:sp>
+        <p:nvSpPr>
+          <p:cNvPr id="12" name="직사각형 11">
+            <a:extLst>
+              <a:ext uri="{FF2B5EF4-FFF2-40B4-BE49-F238E27FC236}">
+                <a16:creationId xmlns:a16="http://schemas.microsoft.com/office/drawing/2014/main" id="{71039356-56CF-8292-9125-4B3779D1A13E}"/>
+              </a:ext>
+            </a:extLst>
+          </p:cNvPr>
+          <p:cNvSpPr/>
+          <p:nvPr/>
+        </p:nvSpPr>
+        <p:spPr>
+          <a:xfrm>
+            <a:off x="7738534" y="598311"/>
+            <a:ext cx="1535289" cy="575733"/>
+          </a:xfrm>
+          <a:prstGeom prst="rect">
+            <a:avLst/>
+          </a:prstGeom>
+        </p:spPr>
+        <p:style>
+          <a:lnRef idx="2">
+            <a:schemeClr val="accent1">
+              <a:shade val="50000"/>
+            </a:schemeClr>
+          </a:lnRef>
+          <a:fillRef idx="1">
+            <a:schemeClr val="accent1"/>
+          </a:fillRef>
+          <a:effectRef idx="0">
+            <a:schemeClr val="accent1"/>
+          </a:effectRef>
+          <a:fontRef idx="minor">
+            <a:schemeClr val="lt1"/>
+          </a:fontRef>
+        </p:style>
+        <p:txBody>
+          <a:bodyPr rtlCol="0" anchor="ctr"/>
+          <a:lstStyle/>
+          <a:p>
+            <a:pPr algn="ctr"/>
+            <a:r>
+              <a:rPr kumimoji="1" lang="ko-KR" altLang="en-US" sz="900" dirty="0"/>
+              <a:t>하나의 </a:t>
+            </a:r>
+            <a:r>
+              <a:rPr kumimoji="1" lang="ko-KR" altLang="en-US" sz="900" dirty="0" err="1"/>
+              <a:t>장소추천글에</a:t>
+            </a:r>
+            <a:r>
+              <a:rPr kumimoji="1" lang="ko-KR" altLang="en-US" sz="900" dirty="0"/>
+              <a:t> </a:t>
+            </a:r>
+            <a:r>
+              <a:rPr kumimoji="1" lang="ko-KR" altLang="en-US" sz="900" dirty="0" err="1"/>
+              <a:t>여러개의</a:t>
+            </a:r>
+            <a:r>
+              <a:rPr kumimoji="1" lang="ko-KR" altLang="en-US" sz="900" dirty="0"/>
+              <a:t> 장소리뷰 저장</a:t>
+            </a:r>
+            <a:endParaRPr kumimoji="1" lang="en-US" altLang="ko-KR" sz="900" dirty="0"/>
+          </a:p>
+          <a:p>
+            <a:pPr algn="ctr"/>
+            <a:r>
+              <a:rPr kumimoji="1" lang="en-US" altLang="ko-Kore-KR" sz="900" dirty="0"/>
+              <a:t>Vo </a:t>
+            </a:r>
+            <a:r>
+              <a:rPr kumimoji="1" lang="ko-KR" altLang="en-US" sz="900" dirty="0"/>
+              <a:t>이용</a:t>
+            </a:r>
+            <a:endParaRPr kumimoji="1" lang="ko-Kore-KR" altLang="en-US" sz="900" dirty="0"/>
+          </a:p>
+        </p:txBody>
+      </p:sp>
+      <p:cxnSp>
+        <p:nvCxnSpPr>
+          <p:cNvPr id="13" name="직선 화살표 연결선 12">
+            <a:extLst>
+              <a:ext uri="{FF2B5EF4-FFF2-40B4-BE49-F238E27FC236}">
+                <a16:creationId xmlns:a16="http://schemas.microsoft.com/office/drawing/2014/main" id="{313C84B9-56D0-89CB-2574-EF418B34354B}"/>
+              </a:ext>
+            </a:extLst>
+          </p:cNvPr>
+          <p:cNvCxnSpPr>
+            <a:cxnSpLocks/>
+            <a:stCxn id="8" idx="3"/>
+            <a:endCxn id="12" idx="1"/>
+          </p:cNvCxnSpPr>
+          <p:nvPr/>
+        </p:nvCxnSpPr>
+        <p:spPr>
+          <a:xfrm>
+            <a:off x="6863644" y="886178"/>
+            <a:ext cx="874890" cy="0"/>
+          </a:xfrm>
+          <a:prstGeom prst="straightConnector1">
+            <a:avLst/>
+          </a:prstGeom>
+          <a:ln>
+            <a:tailEnd type="triangle"/>
+          </a:ln>
+        </p:spPr>
+        <p:style>
+          <a:lnRef idx="3">
+            <a:schemeClr val="accent1"/>
+          </a:lnRef>
+          <a:fillRef idx="0">
+            <a:schemeClr val="accent1"/>
+          </a:fillRef>
+          <a:effectRef idx="2">
+            <a:schemeClr val="accent1"/>
+          </a:effectRef>
+          <a:fontRef idx="minor">
+            <a:schemeClr val="tx1"/>
+          </a:fontRef>
+        </p:style>
+      </p:cxnSp>
+      <p:sp>
+        <p:nvSpPr>
+          <p:cNvPr id="15" name="직사각형 14">
+            <a:extLst>
+              <a:ext uri="{FF2B5EF4-FFF2-40B4-BE49-F238E27FC236}">
+                <a16:creationId xmlns:a16="http://schemas.microsoft.com/office/drawing/2014/main" id="{94B2A7CC-0854-E95E-FA9D-88220D619B55}"/>
+              </a:ext>
+            </a:extLst>
+          </p:cNvPr>
+          <p:cNvSpPr/>
+          <p:nvPr/>
+        </p:nvSpPr>
+        <p:spPr>
+          <a:xfrm>
+            <a:off x="10148713" y="598310"/>
+            <a:ext cx="1535289" cy="575733"/>
+          </a:xfrm>
+          <a:prstGeom prst="rect">
+            <a:avLst/>
+          </a:prstGeom>
+        </p:spPr>
+        <p:style>
+          <a:lnRef idx="2">
+            <a:schemeClr val="accent1">
+              <a:shade val="50000"/>
+            </a:schemeClr>
+          </a:lnRef>
+          <a:fillRef idx="1">
+            <a:schemeClr val="accent1"/>
+          </a:fillRef>
+          <a:effectRef idx="0">
+            <a:schemeClr val="accent1"/>
+          </a:effectRef>
+          <a:fontRef idx="minor">
+            <a:schemeClr val="lt1"/>
+          </a:fontRef>
+        </p:style>
+        <p:txBody>
+          <a:bodyPr rtlCol="0" anchor="ctr"/>
+          <a:lstStyle/>
+          <a:p>
+            <a:pPr algn="ctr"/>
+            <a:r>
+              <a:rPr lang="ko-KR" altLang="en-US" sz="900" dirty="0" err="1">
+                <a:solidFill>
+                  <a:schemeClr val="bg1"/>
+                </a:solidFill>
+                <a:effectLst/>
+              </a:rPr>
+              <a:t>장소추천글에</a:t>
+            </a:r>
+            <a:r>
+              <a:rPr lang="ko-KR" altLang="en-US" sz="900" dirty="0">
+                <a:solidFill>
+                  <a:schemeClr val="bg1"/>
+                </a:solidFill>
+                <a:effectLst/>
+              </a:rPr>
+              <a:t> </a:t>
+            </a:r>
+            <a:endParaRPr lang="en-US" altLang="ko-KR" sz="900" dirty="0">
+              <a:solidFill>
+                <a:schemeClr val="bg1"/>
+              </a:solidFill>
+              <a:effectLst/>
+            </a:endParaRPr>
+          </a:p>
+          <a:p>
+            <a:pPr algn="ctr"/>
+            <a:r>
+              <a:rPr lang="ko-KR" altLang="en-US" sz="900" dirty="0">
+                <a:solidFill>
+                  <a:schemeClr val="bg1"/>
+                </a:solidFill>
+                <a:effectLst/>
+              </a:rPr>
+              <a:t>작성자 정보 저장</a:t>
+            </a:r>
+            <a:endParaRPr lang="en-US" altLang="ko-KR" sz="900" dirty="0">
+              <a:solidFill>
+                <a:schemeClr val="bg1"/>
+              </a:solidFill>
+              <a:effectLst/>
+            </a:endParaRPr>
+          </a:p>
+          <a:p>
+            <a:pPr algn="ctr"/>
+            <a:r>
+              <a:rPr kumimoji="1" lang="en-US" altLang="ko-Kore-KR" sz="900" dirty="0"/>
+              <a:t>Vo </a:t>
+            </a:r>
+            <a:r>
+              <a:rPr kumimoji="1" lang="ko-KR" altLang="en-US" sz="900" dirty="0"/>
+              <a:t>이용</a:t>
+            </a:r>
+            <a:endParaRPr kumimoji="1" lang="ko-Kore-KR" altLang="en-US" sz="900" dirty="0">
+              <a:solidFill>
+                <a:schemeClr val="bg1"/>
+              </a:solidFill>
+            </a:endParaRPr>
+          </a:p>
+        </p:txBody>
+      </p:sp>
+      <p:cxnSp>
+        <p:nvCxnSpPr>
+          <p:cNvPr id="16" name="직선 화살표 연결선 15">
+            <a:extLst>
+              <a:ext uri="{FF2B5EF4-FFF2-40B4-BE49-F238E27FC236}">
+                <a16:creationId xmlns:a16="http://schemas.microsoft.com/office/drawing/2014/main" id="{3D782CA2-4203-6305-9CFF-5E61E20F7F8B}"/>
+              </a:ext>
+            </a:extLst>
+          </p:cNvPr>
+          <p:cNvCxnSpPr>
+            <a:cxnSpLocks/>
+            <a:stCxn id="12" idx="3"/>
+            <a:endCxn id="15" idx="1"/>
+          </p:cNvCxnSpPr>
+          <p:nvPr/>
+        </p:nvCxnSpPr>
+        <p:spPr>
+          <a:xfrm flipV="1">
+            <a:off x="9273823" y="886177"/>
+            <a:ext cx="874890" cy="1"/>
+          </a:xfrm>
+          <a:prstGeom prst="straightConnector1">
+            <a:avLst/>
+          </a:prstGeom>
+          <a:ln>
+            <a:tailEnd type="triangle"/>
+          </a:ln>
+        </p:spPr>
+        <p:style>
+          <a:lnRef idx="3">
+            <a:schemeClr val="accent1"/>
+          </a:lnRef>
+          <a:fillRef idx="0">
+            <a:schemeClr val="accent1"/>
+          </a:fillRef>
+          <a:effectRef idx="2">
+            <a:schemeClr val="accent1"/>
+          </a:effectRef>
+          <a:fontRef idx="minor">
+            <a:schemeClr val="tx1"/>
+          </a:fontRef>
+        </p:style>
+      </p:cxnSp>
+      <p:sp>
+        <p:nvSpPr>
+          <p:cNvPr id="20" name="직사각형 19">
+            <a:extLst>
+              <a:ext uri="{FF2B5EF4-FFF2-40B4-BE49-F238E27FC236}">
+                <a16:creationId xmlns:a16="http://schemas.microsoft.com/office/drawing/2014/main" id="{CDB9F31B-BB5B-3CDE-4E2D-C1F7E46633CD}"/>
+              </a:ext>
+            </a:extLst>
+          </p:cNvPr>
+          <p:cNvSpPr/>
+          <p:nvPr/>
+        </p:nvSpPr>
+        <p:spPr>
+          <a:xfrm>
+            <a:off x="474134" y="2342441"/>
+            <a:ext cx="11492088" cy="1456263"/>
+          </a:xfrm>
+          <a:prstGeom prst="rect">
+            <a:avLst/>
+          </a:prstGeom>
+        </p:spPr>
+        <p:style>
+          <a:lnRef idx="3">
+            <a:schemeClr val="lt1"/>
+          </a:lnRef>
+          <a:fillRef idx="1">
+            <a:schemeClr val="accent5"/>
+          </a:fillRef>
+          <a:effectRef idx="1">
+            <a:schemeClr val="accent5"/>
+          </a:effectRef>
+          <a:fontRef idx="minor">
+            <a:schemeClr val="lt1"/>
+          </a:fontRef>
+        </p:style>
+        <p:txBody>
+          <a:bodyPr rtlCol="0" anchor="t"/>
+          <a:lstStyle/>
+          <a:p>
+            <a:pPr algn="ctr"/>
+            <a:r>
+              <a:rPr kumimoji="1" lang="en-US" altLang="ko-Kore-KR" dirty="0" err="1"/>
+              <a:t>RecommendationService</a:t>
+            </a:r>
+            <a:endParaRPr kumimoji="1" lang="ko-Kore-KR" altLang="en-US" dirty="0"/>
+          </a:p>
+        </p:txBody>
+      </p:sp>
+      <p:sp>
+        <p:nvSpPr>
+          <p:cNvPr id="21" name="직사각형 20">
+            <a:extLst>
+              <a:ext uri="{FF2B5EF4-FFF2-40B4-BE49-F238E27FC236}">
+                <a16:creationId xmlns:a16="http://schemas.microsoft.com/office/drawing/2014/main" id="{6112B4E8-4CBE-8E43-9F5E-2968AAA6EBDB}"/>
+              </a:ext>
+            </a:extLst>
+          </p:cNvPr>
+          <p:cNvSpPr/>
+          <p:nvPr/>
+        </p:nvSpPr>
+        <p:spPr>
+          <a:xfrm>
+            <a:off x="615244" y="2965776"/>
+            <a:ext cx="2116667" cy="575733"/>
+          </a:xfrm>
+          <a:prstGeom prst="rect">
+            <a:avLst/>
+          </a:prstGeom>
+        </p:spPr>
+        <p:style>
+          <a:lnRef idx="2">
+            <a:schemeClr val="accent1">
+              <a:shade val="50000"/>
+            </a:schemeClr>
+          </a:lnRef>
+          <a:fillRef idx="1">
+            <a:schemeClr val="accent1"/>
+          </a:fillRef>
+          <a:effectRef idx="0">
+            <a:schemeClr val="accent1"/>
+          </a:effectRef>
+          <a:fontRef idx="minor">
+            <a:schemeClr val="lt1"/>
+          </a:fontRef>
+        </p:style>
+        <p:txBody>
+          <a:bodyPr rtlCol="0" anchor="ctr"/>
+          <a:lstStyle/>
+          <a:p>
+            <a:pPr algn="ctr"/>
+            <a:r>
+              <a:rPr kumimoji="1" lang="en-US" altLang="ko-KR" sz="900" dirty="0" err="1"/>
+              <a:t>recommendationAdd</a:t>
+            </a:r>
+            <a:r>
+              <a:rPr kumimoji="1" lang="en-US" altLang="ko-KR" sz="900" dirty="0"/>
+              <a:t>(Recommendation)</a:t>
+            </a:r>
+            <a:endParaRPr kumimoji="1" lang="ko-Kore-KR" altLang="en-US" sz="900" dirty="0"/>
+          </a:p>
+        </p:txBody>
+      </p:sp>
+      <p:sp>
+        <p:nvSpPr>
+          <p:cNvPr id="22" name="직사각형 21">
+            <a:extLst>
+              <a:ext uri="{FF2B5EF4-FFF2-40B4-BE49-F238E27FC236}">
+                <a16:creationId xmlns:a16="http://schemas.microsoft.com/office/drawing/2014/main" id="{A2ABF3C2-C5A4-051B-2693-0F63E56FD600}"/>
+              </a:ext>
+            </a:extLst>
+          </p:cNvPr>
+          <p:cNvSpPr/>
+          <p:nvPr/>
+        </p:nvSpPr>
+        <p:spPr>
+          <a:xfrm>
+            <a:off x="3646310" y="2960131"/>
+            <a:ext cx="1535289" cy="575733"/>
+          </a:xfrm>
+          <a:prstGeom prst="rect">
+            <a:avLst/>
+          </a:prstGeom>
+        </p:spPr>
+        <p:style>
+          <a:lnRef idx="2">
+            <a:schemeClr val="accent1">
+              <a:shade val="50000"/>
+            </a:schemeClr>
+          </a:lnRef>
+          <a:fillRef idx="1">
+            <a:schemeClr val="accent1"/>
+          </a:fillRef>
+          <a:effectRef idx="0">
+            <a:schemeClr val="accent1"/>
+          </a:effectRef>
+          <a:fontRef idx="minor">
+            <a:schemeClr val="lt1"/>
+          </a:fontRef>
+        </p:style>
+        <p:txBody>
+          <a:bodyPr rtlCol="0" anchor="ctr"/>
+          <a:lstStyle/>
+          <a:p>
+            <a:pPr algn="ctr"/>
+            <a:r>
+              <a:rPr kumimoji="1" lang="ko-KR" altLang="en-US" sz="900" dirty="0"/>
+              <a:t>게시글 등록</a:t>
+            </a:r>
+            <a:endParaRPr kumimoji="1" lang="ko-Kore-KR" altLang="en-US" sz="900" dirty="0"/>
+          </a:p>
+        </p:txBody>
+      </p:sp>
+      <p:cxnSp>
+        <p:nvCxnSpPr>
+          <p:cNvPr id="23" name="직선 화살표 연결선 22">
+            <a:extLst>
+              <a:ext uri="{FF2B5EF4-FFF2-40B4-BE49-F238E27FC236}">
+                <a16:creationId xmlns:a16="http://schemas.microsoft.com/office/drawing/2014/main" id="{A2F0F479-75EC-9517-8AE8-515AD70F881A}"/>
+              </a:ext>
+            </a:extLst>
+          </p:cNvPr>
+          <p:cNvCxnSpPr>
+            <a:cxnSpLocks/>
+            <a:stCxn id="21" idx="3"/>
+            <a:endCxn id="22" idx="1"/>
+          </p:cNvCxnSpPr>
+          <p:nvPr/>
+        </p:nvCxnSpPr>
+        <p:spPr>
+          <a:xfrm flipV="1">
+            <a:off x="2731911" y="3247998"/>
+            <a:ext cx="914399" cy="5645"/>
+          </a:xfrm>
+          <a:prstGeom prst="straightConnector1">
+            <a:avLst/>
+          </a:prstGeom>
+          <a:ln>
+            <a:tailEnd type="triangle"/>
+          </a:ln>
+        </p:spPr>
+        <p:style>
+          <a:lnRef idx="3">
+            <a:schemeClr val="accent1"/>
+          </a:lnRef>
+          <a:fillRef idx="0">
+            <a:schemeClr val="accent1"/>
+          </a:fillRef>
+          <a:effectRef idx="2">
+            <a:schemeClr val="accent1"/>
+          </a:effectRef>
+          <a:fontRef idx="minor">
+            <a:schemeClr val="tx1"/>
+          </a:fontRef>
+        </p:style>
+      </p:cxnSp>
+      <p:sp>
+        <p:nvSpPr>
+          <p:cNvPr id="25" name="직사각형 24">
+            <a:extLst>
+              <a:ext uri="{FF2B5EF4-FFF2-40B4-BE49-F238E27FC236}">
+                <a16:creationId xmlns:a16="http://schemas.microsoft.com/office/drawing/2014/main" id="{FE4439A4-524F-43AF-ACB4-DC0263A87038}"/>
+              </a:ext>
+            </a:extLst>
+          </p:cNvPr>
+          <p:cNvSpPr/>
+          <p:nvPr/>
+        </p:nvSpPr>
+        <p:spPr>
+          <a:xfrm>
+            <a:off x="3025423" y="4515546"/>
+            <a:ext cx="2788356" cy="1456263"/>
+          </a:xfrm>
+          <a:prstGeom prst="rect">
+            <a:avLst/>
+          </a:prstGeom>
+        </p:spPr>
+        <p:style>
+          <a:lnRef idx="3">
+            <a:schemeClr val="lt1"/>
+          </a:lnRef>
+          <a:fillRef idx="1">
+            <a:schemeClr val="accent5"/>
+          </a:fillRef>
+          <a:effectRef idx="1">
+            <a:schemeClr val="accent5"/>
+          </a:effectRef>
+          <a:fontRef idx="minor">
+            <a:schemeClr val="lt1"/>
+          </a:fontRef>
+        </p:style>
+        <p:txBody>
+          <a:bodyPr rtlCol="0" anchor="t"/>
+          <a:lstStyle/>
+          <a:p>
+            <a:pPr algn="ctr"/>
+            <a:r>
+              <a:rPr kumimoji="1" lang="en-US" altLang="ko-Kore-KR" dirty="0" err="1"/>
+              <a:t>RecommendationDao</a:t>
+            </a:r>
+            <a:endParaRPr kumimoji="1" lang="ko-Kore-KR" altLang="en-US" dirty="0"/>
+          </a:p>
+        </p:txBody>
+      </p:sp>
+      <p:sp>
+        <p:nvSpPr>
+          <p:cNvPr id="27" name="직사각형 26">
+            <a:extLst>
+              <a:ext uri="{FF2B5EF4-FFF2-40B4-BE49-F238E27FC236}">
+                <a16:creationId xmlns:a16="http://schemas.microsoft.com/office/drawing/2014/main" id="{78220275-8FD9-F445-6CCE-CC9485559CD8}"/>
+              </a:ext>
+            </a:extLst>
+          </p:cNvPr>
+          <p:cNvSpPr/>
+          <p:nvPr/>
+        </p:nvSpPr>
+        <p:spPr>
+          <a:xfrm>
+            <a:off x="3375376" y="5121959"/>
+            <a:ext cx="2116667" cy="575733"/>
+          </a:xfrm>
+          <a:prstGeom prst="rect">
+            <a:avLst/>
+          </a:prstGeom>
+        </p:spPr>
+        <p:style>
+          <a:lnRef idx="2">
+            <a:schemeClr val="accent1">
+              <a:shade val="50000"/>
+            </a:schemeClr>
+          </a:lnRef>
+          <a:fillRef idx="1">
+            <a:schemeClr val="accent1"/>
+          </a:fillRef>
+          <a:effectRef idx="0">
+            <a:schemeClr val="accent1"/>
+          </a:effectRef>
+          <a:fontRef idx="minor">
+            <a:schemeClr val="lt1"/>
+          </a:fontRef>
+        </p:style>
+        <p:txBody>
+          <a:bodyPr rtlCol="0" anchor="ctr"/>
+          <a:lstStyle/>
+          <a:p>
+            <a:pPr algn="ctr"/>
+            <a:r>
+              <a:rPr kumimoji="1" lang="en-US" altLang="ko-KR" sz="900" dirty="0" err="1"/>
+              <a:t>recommendationAdd</a:t>
+            </a:r>
+            <a:r>
+              <a:rPr kumimoji="1" lang="en-US" altLang="ko-KR" sz="900" dirty="0"/>
+              <a:t>(Recommendation)</a:t>
+            </a:r>
+            <a:endParaRPr kumimoji="1" lang="ko-Kore-KR" altLang="en-US" sz="900" dirty="0"/>
+          </a:p>
+        </p:txBody>
+      </p:sp>
+      <p:cxnSp>
+        <p:nvCxnSpPr>
+          <p:cNvPr id="28" name="직선 화살표 연결선 27">
+            <a:extLst>
+              <a:ext uri="{FF2B5EF4-FFF2-40B4-BE49-F238E27FC236}">
+                <a16:creationId xmlns:a16="http://schemas.microsoft.com/office/drawing/2014/main" id="{EA75A04A-C255-930A-17F5-730FEA923345}"/>
+              </a:ext>
+            </a:extLst>
+          </p:cNvPr>
+          <p:cNvCxnSpPr>
+            <a:cxnSpLocks/>
+            <a:stCxn id="22" idx="2"/>
+            <a:endCxn id="27" idx="0"/>
+          </p:cNvCxnSpPr>
+          <p:nvPr/>
+        </p:nvCxnSpPr>
+        <p:spPr>
+          <a:xfrm>
+            <a:off x="4413955" y="3535864"/>
+            <a:ext cx="19755" cy="1586095"/>
+          </a:xfrm>
+          <a:prstGeom prst="straightConnector1">
+            <a:avLst/>
+          </a:prstGeom>
+          <a:ln>
+            <a:tailEnd type="triangle"/>
+          </a:ln>
+        </p:spPr>
+        <p:style>
+          <a:lnRef idx="3">
+            <a:schemeClr val="accent1"/>
+          </a:lnRef>
+          <a:fillRef idx="0">
+            <a:schemeClr val="accent1"/>
+          </a:fillRef>
+          <a:effectRef idx="2">
+            <a:schemeClr val="accent1"/>
+          </a:effectRef>
+          <a:fontRef idx="minor">
+            <a:schemeClr val="tx1"/>
+          </a:fontRef>
+        </p:style>
+      </p:cxnSp>
+      <p:sp>
+        <p:nvSpPr>
+          <p:cNvPr id="31" name="직사각형 30">
+            <a:extLst>
+              <a:ext uri="{FF2B5EF4-FFF2-40B4-BE49-F238E27FC236}">
+                <a16:creationId xmlns:a16="http://schemas.microsoft.com/office/drawing/2014/main" id="{2D538AC4-0280-AB79-0DC1-74F5573F70CE}"/>
+              </a:ext>
+            </a:extLst>
+          </p:cNvPr>
+          <p:cNvSpPr/>
+          <p:nvPr/>
+        </p:nvSpPr>
+        <p:spPr>
+          <a:xfrm>
+            <a:off x="6031086" y="2960130"/>
+            <a:ext cx="1535289" cy="575733"/>
+          </a:xfrm>
+          <a:prstGeom prst="rect">
+            <a:avLst/>
+          </a:prstGeom>
+        </p:spPr>
+        <p:style>
+          <a:lnRef idx="2">
+            <a:schemeClr val="accent1">
+              <a:shade val="50000"/>
+            </a:schemeClr>
+          </a:lnRef>
+          <a:fillRef idx="1">
+            <a:schemeClr val="accent1"/>
+          </a:fillRef>
+          <a:effectRef idx="0">
+            <a:schemeClr val="accent1"/>
+          </a:effectRef>
+          <a:fontRef idx="minor">
+            <a:schemeClr val="lt1"/>
+          </a:fontRef>
+        </p:style>
+        <p:txBody>
+          <a:bodyPr rtlCol="0" anchor="ctr"/>
+          <a:lstStyle/>
+          <a:p>
+            <a:pPr algn="ctr"/>
+            <a:r>
+              <a:rPr kumimoji="1" lang="ko-KR" altLang="en-US" sz="900" dirty="0"/>
+              <a:t>첨부파일 등록</a:t>
+            </a:r>
+            <a:endParaRPr kumimoji="1" lang="ko-Kore-KR" altLang="en-US" sz="900" dirty="0"/>
+          </a:p>
+        </p:txBody>
+      </p:sp>
+      <p:cxnSp>
+        <p:nvCxnSpPr>
+          <p:cNvPr id="32" name="직선 화살표 연결선 31">
+            <a:extLst>
+              <a:ext uri="{FF2B5EF4-FFF2-40B4-BE49-F238E27FC236}">
+                <a16:creationId xmlns:a16="http://schemas.microsoft.com/office/drawing/2014/main" id="{91D81C74-1B6A-FA15-50EF-753A4202787E}"/>
+              </a:ext>
+            </a:extLst>
+          </p:cNvPr>
+          <p:cNvCxnSpPr>
+            <a:cxnSpLocks/>
+            <a:stCxn id="22" idx="3"/>
+            <a:endCxn id="31" idx="1"/>
+          </p:cNvCxnSpPr>
+          <p:nvPr/>
+        </p:nvCxnSpPr>
+        <p:spPr>
+          <a:xfrm flipV="1">
+            <a:off x="5181599" y="3247997"/>
+            <a:ext cx="849487" cy="1"/>
+          </a:xfrm>
+          <a:prstGeom prst="straightConnector1">
+            <a:avLst/>
+          </a:prstGeom>
+          <a:ln>
+            <a:tailEnd type="triangle"/>
+          </a:ln>
+        </p:spPr>
+        <p:style>
+          <a:lnRef idx="3">
+            <a:schemeClr val="accent1"/>
+          </a:lnRef>
+          <a:fillRef idx="0">
+            <a:schemeClr val="accent1"/>
+          </a:fillRef>
+          <a:effectRef idx="2">
+            <a:schemeClr val="accent1"/>
+          </a:effectRef>
+          <a:fontRef idx="minor">
+            <a:schemeClr val="tx1"/>
+          </a:fontRef>
+        </p:style>
+      </p:cxnSp>
+      <p:sp>
+        <p:nvSpPr>
+          <p:cNvPr id="35" name="직사각형 34">
+            <a:extLst>
+              <a:ext uri="{FF2B5EF4-FFF2-40B4-BE49-F238E27FC236}">
+                <a16:creationId xmlns:a16="http://schemas.microsoft.com/office/drawing/2014/main" id="{FC59932F-99BF-75CE-3AB4-9C03410AE6B1}"/>
+              </a:ext>
+            </a:extLst>
+          </p:cNvPr>
+          <p:cNvSpPr/>
+          <p:nvPr/>
+        </p:nvSpPr>
+        <p:spPr>
+          <a:xfrm>
+            <a:off x="6096000" y="4515546"/>
+            <a:ext cx="3452987" cy="1456263"/>
+          </a:xfrm>
+          <a:prstGeom prst="rect">
+            <a:avLst/>
+          </a:prstGeom>
+        </p:spPr>
+        <p:style>
+          <a:lnRef idx="3">
+            <a:schemeClr val="lt1"/>
+          </a:lnRef>
+          <a:fillRef idx="1">
+            <a:schemeClr val="accent5"/>
+          </a:fillRef>
+          <a:effectRef idx="1">
+            <a:schemeClr val="accent5"/>
+          </a:effectRef>
+          <a:fontRef idx="minor">
+            <a:schemeClr val="lt1"/>
+          </a:fontRef>
+        </p:style>
+        <p:txBody>
+          <a:bodyPr rtlCol="0" anchor="t"/>
+          <a:lstStyle/>
+          <a:p>
+            <a:pPr algn="ctr"/>
+            <a:r>
+              <a:rPr kumimoji="1" lang="en-US" altLang="ko-Kore-KR" dirty="0" err="1"/>
+              <a:t>JangSoReviewDao</a:t>
+            </a:r>
+            <a:endParaRPr kumimoji="1" lang="ko-Kore-KR" altLang="en-US" dirty="0"/>
+          </a:p>
+        </p:txBody>
+      </p:sp>
+      <p:sp>
+        <p:nvSpPr>
+          <p:cNvPr id="36" name="직사각형 35">
+            <a:extLst>
+              <a:ext uri="{FF2B5EF4-FFF2-40B4-BE49-F238E27FC236}">
+                <a16:creationId xmlns:a16="http://schemas.microsoft.com/office/drawing/2014/main" id="{4452EEDF-7FA5-7904-99F8-1B2E1B49E04E}"/>
+              </a:ext>
+            </a:extLst>
+          </p:cNvPr>
+          <p:cNvSpPr/>
+          <p:nvPr/>
+        </p:nvSpPr>
+        <p:spPr>
+          <a:xfrm>
+            <a:off x="6639980" y="5127597"/>
+            <a:ext cx="2365026" cy="575733"/>
+          </a:xfrm>
+          <a:prstGeom prst="rect">
+            <a:avLst/>
+          </a:prstGeom>
+        </p:spPr>
+        <p:style>
+          <a:lnRef idx="2">
+            <a:schemeClr val="accent1">
+              <a:shade val="50000"/>
+            </a:schemeClr>
+          </a:lnRef>
+          <a:fillRef idx="1">
+            <a:schemeClr val="accent1"/>
+          </a:fillRef>
+          <a:effectRef idx="0">
+            <a:schemeClr val="accent1"/>
+          </a:effectRef>
+          <a:fontRef idx="minor">
+            <a:schemeClr val="lt1"/>
+          </a:fontRef>
+        </p:style>
+        <p:txBody>
+          <a:bodyPr rtlCol="0" anchor="ctr"/>
+          <a:lstStyle/>
+          <a:p>
+            <a:pPr algn="ctr"/>
+            <a:r>
+              <a:rPr lang="en" altLang="ko-Kore-KR" sz="900" dirty="0" err="1"/>
+              <a:t>jangSoReviewInsertFiles</a:t>
+            </a:r>
+            <a:r>
+              <a:rPr kumimoji="1" lang="en-US" altLang="ko-KR" sz="900" dirty="0"/>
+              <a:t>(</a:t>
+            </a:r>
+            <a:r>
+              <a:rPr kumimoji="1" lang="en-US" altLang="ko-KR" sz="900" dirty="0" err="1"/>
+              <a:t>JangSoReview</a:t>
+            </a:r>
+            <a:r>
+              <a:rPr kumimoji="1" lang="en-US" altLang="ko-KR" sz="900" dirty="0"/>
+              <a:t>)</a:t>
+            </a:r>
+            <a:endParaRPr kumimoji="1" lang="ko-Kore-KR" altLang="en-US" sz="900" dirty="0"/>
+          </a:p>
+        </p:txBody>
+      </p:sp>
+      <p:cxnSp>
+        <p:nvCxnSpPr>
+          <p:cNvPr id="37" name="직선 화살표 연결선 36">
+            <a:extLst>
+              <a:ext uri="{FF2B5EF4-FFF2-40B4-BE49-F238E27FC236}">
+                <a16:creationId xmlns:a16="http://schemas.microsoft.com/office/drawing/2014/main" id="{99577519-CAEB-7529-C24B-EAE19BC9D2F3}"/>
+              </a:ext>
+            </a:extLst>
+          </p:cNvPr>
+          <p:cNvCxnSpPr>
+            <a:cxnSpLocks/>
+            <a:stCxn id="31" idx="2"/>
+            <a:endCxn id="36" idx="0"/>
+          </p:cNvCxnSpPr>
+          <p:nvPr/>
+        </p:nvCxnSpPr>
+        <p:spPr>
+          <a:xfrm>
+            <a:off x="6798731" y="3535863"/>
+            <a:ext cx="1023762" cy="1591734"/>
+          </a:xfrm>
+          <a:prstGeom prst="straightConnector1">
+            <a:avLst/>
+          </a:prstGeom>
+          <a:ln>
+            <a:tailEnd type="triangle"/>
+          </a:ln>
+        </p:spPr>
+        <p:style>
+          <a:lnRef idx="3">
+            <a:schemeClr val="accent1"/>
+          </a:lnRef>
+          <a:fillRef idx="0">
+            <a:schemeClr val="accent1"/>
+          </a:fillRef>
+          <a:effectRef idx="2">
+            <a:schemeClr val="accent1"/>
+          </a:effectRef>
+          <a:fontRef idx="minor">
+            <a:schemeClr val="tx1"/>
+          </a:fontRef>
+        </p:style>
+      </p:cxnSp>
+      <p:cxnSp>
+        <p:nvCxnSpPr>
+          <p:cNvPr id="40" name="직선 화살표 연결선 39">
+            <a:extLst>
+              <a:ext uri="{FF2B5EF4-FFF2-40B4-BE49-F238E27FC236}">
+                <a16:creationId xmlns:a16="http://schemas.microsoft.com/office/drawing/2014/main" id="{CCBCC06D-B79B-913B-220C-BF07D8140400}"/>
+              </a:ext>
+            </a:extLst>
+          </p:cNvPr>
+          <p:cNvCxnSpPr>
+            <a:cxnSpLocks/>
+            <a:stCxn id="17" idx="2"/>
+            <a:endCxn id="20" idx="0"/>
+          </p:cNvCxnSpPr>
+          <p:nvPr/>
+        </p:nvCxnSpPr>
+        <p:spPr>
+          <a:xfrm flipH="1">
+            <a:off x="6220178" y="1614307"/>
+            <a:ext cx="2167467" cy="728134"/>
+          </a:xfrm>
+          <a:prstGeom prst="straightConnector1">
+            <a:avLst/>
+          </a:prstGeom>
+          <a:ln>
+            <a:tailEnd type="triangle"/>
+          </a:ln>
+        </p:spPr>
+        <p:style>
+          <a:lnRef idx="3">
+            <a:schemeClr val="accent1"/>
+          </a:lnRef>
+          <a:fillRef idx="0">
+            <a:schemeClr val="accent1"/>
+          </a:fillRef>
+          <a:effectRef idx="2">
+            <a:schemeClr val="accent1"/>
+          </a:effectRef>
+          <a:fontRef idx="minor">
+            <a:schemeClr val="tx1"/>
+          </a:fontRef>
+        </p:style>
+      </p:cxnSp>
+    </p:spTree>
+    <p:extLst>
+      <p:ext uri="{BB962C8B-B14F-4D97-AF65-F5344CB8AC3E}">
+        <p14:creationId xmlns:p14="http://schemas.microsoft.com/office/powerpoint/2010/main" val="1358950472"/>
+      </p:ext>
+    </p:extLst>
+  </p:cSld>
+  <p:clrMapOvr>
+    <a:masterClrMapping/>
+  </p:clrMapOvr>
+</p:sld>
+</file>
+
 <file path=ppt/theme/theme1.xml><?xml version="1.0" encoding="utf-8"?>
 <a:theme xmlns:a="http://schemas.openxmlformats.org/drawingml/2006/main" name="Office 테마">
   <a:themeElements>

</xml_diff>